<commit_message>
updates to final copies. Final_v2 is most updated.
</commit_message>
<xml_diff>
--- a/NYCSchoolsProject_Slides.pptx
+++ b/NYCSchoolsProject_Slides.pptx
@@ -9,10 +9,11 @@
     <p:sldId id="257" r:id="rId3"/>
     <p:sldId id="258" r:id="rId4"/>
     <p:sldId id="259" r:id="rId5"/>
-    <p:sldId id="260" r:id="rId6"/>
-    <p:sldId id="261" r:id="rId7"/>
-    <p:sldId id="262" r:id="rId8"/>
-    <p:sldId id="263" r:id="rId9"/>
+    <p:sldId id="264" r:id="rId6"/>
+    <p:sldId id="260" r:id="rId7"/>
+    <p:sldId id="261" r:id="rId8"/>
+    <p:sldId id="262" r:id="rId9"/>
+    <p:sldId id="263" r:id="rId10"/>
   </p:sldIdLst>
   <p:sldSz cx="12192000" cy="6858000"/>
   <p:notesSz cx="6858000" cy="9144000"/>
@@ -246,7 +247,7 @@
             <a:fld id="{87DE6118-2437-4B30-8E3C-4D2BE6020583}" type="datetimeFigureOut">
               <a:rPr lang="en-US" smtClean="0"/>
               <a:pPr/>
-              <a:t>12/1/16</a:t>
+              <a:t>12/2/2016</a:t>
             </a:fld>
             <a:endParaRPr lang="en-US" dirty="0"/>
           </a:p>
@@ -417,7 +418,7 @@
           <a:p>
             <a:fld id="{87DE6118-2437-4B30-8E3C-4D2BE6020583}" type="datetimeFigureOut">
               <a:rPr lang="en-US" smtClean="0"/>
-              <a:t>12/1/16</a:t>
+              <a:t>12/2/2016</a:t>
             </a:fld>
             <a:endParaRPr lang="en-US" dirty="0"/>
           </a:p>
@@ -597,7 +598,7 @@
           <a:p>
             <a:fld id="{87DE6118-2437-4B30-8E3C-4D2BE6020583}" type="datetimeFigureOut">
               <a:rPr lang="en-US" smtClean="0"/>
-              <a:t>12/1/16</a:t>
+              <a:t>12/2/2016</a:t>
             </a:fld>
             <a:endParaRPr lang="en-US" dirty="0"/>
           </a:p>
@@ -767,7 +768,7 @@
           <a:p>
             <a:fld id="{87DE6118-2437-4B30-8E3C-4D2BE6020583}" type="datetimeFigureOut">
               <a:rPr lang="en-US" smtClean="0"/>
-              <a:t>12/1/16</a:t>
+              <a:t>12/2/2016</a:t>
             </a:fld>
             <a:endParaRPr lang="en-US" dirty="0"/>
           </a:p>
@@ -1014,7 +1015,7 @@
             <a:fld id="{87DE6118-2437-4B30-8E3C-4D2BE6020583}" type="datetimeFigureOut">
               <a:rPr lang="en-US" smtClean="0"/>
               <a:pPr/>
-              <a:t>12/1/16</a:t>
+              <a:t>12/2/2016</a:t>
             </a:fld>
             <a:endParaRPr lang="en-US" dirty="0"/>
           </a:p>
@@ -1247,7 +1248,7 @@
           <a:p>
             <a:fld id="{87DE6118-2437-4B30-8E3C-4D2BE6020583}" type="datetimeFigureOut">
               <a:rPr lang="en-US" smtClean="0"/>
-              <a:t>12/1/16</a:t>
+              <a:t>12/2/2016</a:t>
             </a:fld>
             <a:endParaRPr lang="en-US" dirty="0"/>
           </a:p>
@@ -1614,7 +1615,7 @@
           <a:p>
             <a:fld id="{87DE6118-2437-4B30-8E3C-4D2BE6020583}" type="datetimeFigureOut">
               <a:rPr lang="en-US" smtClean="0"/>
-              <a:t>12/1/16</a:t>
+              <a:t>12/2/2016</a:t>
             </a:fld>
             <a:endParaRPr lang="en-US" dirty="0"/>
           </a:p>
@@ -1732,7 +1733,7 @@
           <a:p>
             <a:fld id="{87DE6118-2437-4B30-8E3C-4D2BE6020583}" type="datetimeFigureOut">
               <a:rPr lang="en-US" smtClean="0"/>
-              <a:t>12/1/16</a:t>
+              <a:t>12/2/2016</a:t>
             </a:fld>
             <a:endParaRPr lang="en-US" dirty="0"/>
           </a:p>
@@ -1827,7 +1828,7 @@
           <a:p>
             <a:fld id="{87DE6118-2437-4B30-8E3C-4D2BE6020583}" type="datetimeFigureOut">
               <a:rPr lang="en-US" smtClean="0"/>
-              <a:t>12/1/16</a:t>
+              <a:t>12/2/2016</a:t>
             </a:fld>
             <a:endParaRPr lang="en-US" dirty="0"/>
           </a:p>
@@ -2105,7 +2106,7 @@
             <a:fld id="{87DE6118-2437-4B30-8E3C-4D2BE6020583}" type="datetimeFigureOut">
               <a:rPr lang="en-US" smtClean="0"/>
               <a:pPr/>
-              <a:t>12/1/16</a:t>
+              <a:t>12/2/2016</a:t>
             </a:fld>
             <a:endParaRPr lang="en-US" dirty="0"/>
           </a:p>
@@ -2360,7 +2361,7 @@
             <a:fld id="{87DE6118-2437-4B30-8E3C-4D2BE6020583}" type="datetimeFigureOut">
               <a:rPr lang="en-US" smtClean="0"/>
               <a:pPr/>
-              <a:t>12/1/16</a:t>
+              <a:t>12/2/2016</a:t>
             </a:fld>
             <a:endParaRPr lang="en-US" dirty="0"/>
           </a:p>
@@ -2580,7 +2581,7 @@
             <a:fld id="{87DE6118-2437-4B30-8E3C-4D2BE6020583}" type="datetimeFigureOut">
               <a:rPr lang="en-US" smtClean="0"/>
               <a:pPr/>
-              <a:t>12/1/16</a:t>
+              <a:t>12/2/2016</a:t>
             </a:fld>
             <a:endParaRPr lang="en-US" dirty="0"/>
           </a:p>
@@ -2968,7 +2969,7 @@
   </p:txStyles>
   <p:extLst>
     <p:ext uri="{27BBF7A9-308A-43DC-89C8-2F10F3537804}">
-      <p15:sldGuideLst xmlns:p15="http://schemas.microsoft.com/office/powerpoint/2012/main"/>
+      <p15:sldGuideLst xmlns:p15="http://schemas.microsoft.com/office/powerpoint/2012/main" xmlns=""/>
     </p:ext>
   </p:extLst>
 </p:sldMaster>
@@ -3724,6 +3725,142 @@
 </file>
 
 <file path=ppt/slides/slide5.xml><?xml version="1.0" encoding="utf-8"?>
+<p:sld xmlns:a="http://schemas.openxmlformats.org/drawingml/2006/main" xmlns:r="http://schemas.openxmlformats.org/officeDocument/2006/relationships" xmlns:p="http://schemas.openxmlformats.org/presentationml/2006/main">
+  <p:cSld>
+    <p:spTree>
+      <p:nvGrpSpPr>
+        <p:cNvPr id="1" name=""/>
+        <p:cNvGrpSpPr/>
+        <p:nvPr/>
+      </p:nvGrpSpPr>
+      <p:grpSpPr>
+        <a:xfrm>
+          <a:off x="0" y="0"/>
+          <a:ext cx="0" cy="0"/>
+          <a:chOff x="0" y="0"/>
+          <a:chExt cx="0" cy="0"/>
+        </a:xfrm>
+      </p:grpSpPr>
+      <p:pic>
+        <p:nvPicPr>
+          <p:cNvPr id="2050" name="Picture 2"/>
+          <p:cNvPicPr>
+            <a:picLocks noChangeAspect="1" noChangeArrowheads="1"/>
+          </p:cNvPicPr>
+          <p:nvPr/>
+        </p:nvPicPr>
+        <p:blipFill>
+          <a:blip r:embed="rId2">
+            <a:extLst>
+              <a:ext uri="{28A0092B-C50C-407E-A947-70E740481C1C}">
+                <a14:useLocalDpi xmlns:a14="http://schemas.microsoft.com/office/drawing/2010/main" val="0"/>
+              </a:ext>
+            </a:extLst>
+          </a:blip>
+          <a:srcRect/>
+          <a:stretch>
+            <a:fillRect/>
+          </a:stretch>
+        </p:blipFill>
+        <p:spPr bwMode="auto">
+          <a:xfrm>
+            <a:off x="1901224" y="1439367"/>
+            <a:ext cx="8251770" cy="5434398"/>
+          </a:xfrm>
+          <a:prstGeom prst="rect">
+            <a:avLst/>
+          </a:prstGeom>
+          <a:noFill/>
+          <a:ln>
+            <a:noFill/>
+          </a:ln>
+          <a:extLst>
+            <a:ext uri="{909E8E84-426E-40DD-AFC4-6F175D3DCCD1}">
+              <a14:hiddenFill xmlns:a14="http://schemas.microsoft.com/office/drawing/2010/main">
+                <a:solidFill>
+                  <a:schemeClr val="accent1"/>
+                </a:solidFill>
+              </a14:hiddenFill>
+            </a:ext>
+            <a:ext uri="{91240B29-F687-4F45-9708-019B960494DF}">
+              <a14:hiddenLine xmlns:a14="http://schemas.microsoft.com/office/drawing/2010/main" w="9525">
+                <a:solidFill>
+                  <a:schemeClr val="tx1"/>
+                </a:solidFill>
+                <a:miter lim="800000"/>
+                <a:headEnd/>
+                <a:tailEnd/>
+              </a14:hiddenLine>
+            </a:ext>
+          </a:extLst>
+        </p:spPr>
+      </p:pic>
+      <p:sp>
+        <p:nvSpPr>
+          <p:cNvPr id="3" name="Title 1"/>
+          <p:cNvSpPr txBox="1">
+            <a:spLocks/>
+          </p:cNvSpPr>
+          <p:nvPr/>
+        </p:nvSpPr>
+        <p:spPr>
+          <a:xfrm>
+            <a:off x="838200" y="365126"/>
+            <a:ext cx="10515600" cy="938834"/>
+          </a:xfrm>
+          <a:prstGeom prst="rect">
+            <a:avLst/>
+          </a:prstGeom>
+          <a:ln>
+            <a:solidFill>
+              <a:schemeClr val="accent1"/>
+            </a:solidFill>
+          </a:ln>
+        </p:spPr>
+        <p:txBody>
+          <a:bodyPr/>
+          <a:lstStyle>
+            <a:lvl1pPr algn="l" defTabSz="914400" rtl="0" eaLnBrk="1" latinLnBrk="0" hangingPunct="1">
+              <a:lnSpc>
+                <a:spcPct val="90000"/>
+              </a:lnSpc>
+              <a:spcBef>
+                <a:spcPct val="0"/>
+              </a:spcBef>
+              <a:buNone/>
+              <a:defRPr sz="4400" kern="1200">
+                <a:solidFill>
+                  <a:schemeClr val="tx1"/>
+                </a:solidFill>
+                <a:latin typeface="+mj-lt"/>
+                <a:ea typeface="+mj-ea"/>
+                <a:cs typeface="+mj-cs"/>
+              </a:defRPr>
+            </a:lvl1pPr>
+          </a:lstStyle>
+          <a:p>
+            <a:r>
+              <a:rPr lang="en-US" dirty="0" smtClean="0"/>
+              <a:t>Overall Satisfaction with School</a:t>
+            </a:r>
+            <a:endParaRPr lang="en-US" dirty="0"/>
+          </a:p>
+        </p:txBody>
+      </p:sp>
+    </p:spTree>
+    <p:extLst>
+      <p:ext uri="{BB962C8B-B14F-4D97-AF65-F5344CB8AC3E}">
+        <p14:creationId xmlns:p14="http://schemas.microsoft.com/office/powerpoint/2010/main" val="1301702781"/>
+      </p:ext>
+    </p:extLst>
+  </p:cSld>
+  <p:clrMapOvr>
+    <a:masterClrMapping/>
+  </p:clrMapOvr>
+</p:sld>
+</file>
+
+<file path=ppt/slides/slide6.xml><?xml version="1.0" encoding="utf-8"?>
 <p:sld xmlns:a="http://schemas.openxmlformats.org/drawingml/2006/main" xmlns:r="http://schemas.openxmlformats.org/officeDocument/2006/relationships" xmlns:p="http://schemas.openxmlformats.org/presentationml/2006/main">
   <p:cSld>
     <p:spTree>
@@ -4005,12 +4142,23 @@
         <p:spPr>
           <a:xfrm>
             <a:off x="2147601" y="6065566"/>
-            <a:ext cx="2418682" cy="369332"/>
+            <a:ext cx="2418682" cy="523220"/>
           </a:xfrm>
           <a:prstGeom prst="rect">
             <a:avLst/>
           </a:prstGeom>
-          <a:noFill/>
+          <a:solidFill>
+            <a:schemeClr val="bg1">
+              <a:lumMod val="75000"/>
+            </a:schemeClr>
+          </a:solidFill>
+          <a:effectLst>
+            <a:outerShdw blurRad="50800" dist="38100" dir="2700000" algn="tl" rotWithShape="0">
+              <a:prstClr val="black">
+                <a:alpha val="40000"/>
+              </a:prstClr>
+            </a:outerShdw>
+          </a:effectLst>
         </p:spPr>
         <p:txBody>
           <a:bodyPr wrap="square" rtlCol="0">
@@ -4020,18 +4168,18 @@
           <a:p>
             <a:pPr algn="ctr"/>
             <a:r>
-              <a:rPr lang="en-US" smtClean="0"/>
+              <a:rPr lang="en-US" sz="2800" dirty="0" smtClean="0"/>
               <a:t>R</a:t>
             </a:r>
             <a:r>
-              <a:rPr lang="en-US" baseline="30000" smtClean="0"/>
+              <a:rPr lang="en-US" sz="2800" baseline="30000" dirty="0" smtClean="0"/>
               <a:t>2</a:t>
             </a:r>
             <a:r>
-              <a:rPr lang="en-US" smtClean="0"/>
+              <a:rPr lang="en-US" sz="2800" dirty="0" smtClean="0"/>
               <a:t> = 0.976</a:t>
             </a:r>
-            <a:endParaRPr lang="en-US"/>
+            <a:endParaRPr lang="en-US" sz="2800" dirty="0"/>
           </a:p>
         </p:txBody>
       </p:sp>
@@ -4044,12 +4192,23 @@
         <p:spPr>
           <a:xfrm>
             <a:off x="7685350" y="6065566"/>
-            <a:ext cx="2418682" cy="369332"/>
+            <a:ext cx="2418682" cy="523220"/>
           </a:xfrm>
           <a:prstGeom prst="rect">
             <a:avLst/>
           </a:prstGeom>
-          <a:noFill/>
+          <a:solidFill>
+            <a:schemeClr val="bg1">
+              <a:lumMod val="75000"/>
+            </a:schemeClr>
+          </a:solidFill>
+          <a:effectLst>
+            <a:outerShdw blurRad="50800" dist="38100" dir="2700000" algn="tl" rotWithShape="0">
+              <a:prstClr val="black">
+                <a:alpha val="40000"/>
+              </a:prstClr>
+            </a:outerShdw>
+          </a:effectLst>
         </p:spPr>
         <p:txBody>
           <a:bodyPr wrap="square" rtlCol="0">
@@ -4059,18 +4218,18 @@
           <a:p>
             <a:pPr algn="ctr"/>
             <a:r>
-              <a:rPr lang="en-US" dirty="0" smtClean="0"/>
+              <a:rPr lang="en-US" sz="2800" dirty="0" smtClean="0"/>
               <a:t>R</a:t>
             </a:r>
             <a:r>
-              <a:rPr lang="en-US" baseline="30000" dirty="0" smtClean="0"/>
+              <a:rPr lang="en-US" sz="2800" baseline="30000" dirty="0" smtClean="0"/>
               <a:t>2</a:t>
             </a:r>
             <a:r>
-              <a:rPr lang="en-US" dirty="0" smtClean="0"/>
+              <a:rPr lang="en-US" sz="2800" dirty="0" smtClean="0"/>
               <a:t> = 0.763</a:t>
             </a:r>
-            <a:endParaRPr lang="en-US" dirty="0"/>
+            <a:endParaRPr lang="en-US" sz="2800" dirty="0"/>
           </a:p>
         </p:txBody>
       </p:sp>
@@ -4087,7 +4246,7 @@
 </p:sld>
 </file>
 
-<file path=ppt/slides/slide6.xml><?xml version="1.0" encoding="utf-8"?>
+<file path=ppt/slides/slide7.xml><?xml version="1.0" encoding="utf-8"?>
 <p:sld xmlns:a="http://schemas.openxmlformats.org/drawingml/2006/main" xmlns:r="http://schemas.openxmlformats.org/officeDocument/2006/relationships" xmlns:p="http://schemas.openxmlformats.org/presentationml/2006/main">
   <p:cSld>
     <p:spTree>
@@ -4234,7 +4393,7 @@
 </p:sld>
 </file>
 
-<file path=ppt/slides/slide7.xml><?xml version="1.0" encoding="utf-8"?>
+<file path=ppt/slides/slide8.xml><?xml version="1.0" encoding="utf-8"?>
 <p:sld xmlns:a="http://schemas.openxmlformats.org/drawingml/2006/main" xmlns:r="http://schemas.openxmlformats.org/officeDocument/2006/relationships" xmlns:p="http://schemas.openxmlformats.org/presentationml/2006/main">
   <p:cSld>
     <p:spTree>
@@ -4368,6 +4527,190 @@
           </a:prstGeom>
         </p:spPr>
       </p:pic>
+      <p:cxnSp>
+        <p:nvCxnSpPr>
+          <p:cNvPr id="6" name="Straight Connector 5"/>
+          <p:cNvCxnSpPr/>
+          <p:nvPr/>
+        </p:nvCxnSpPr>
+        <p:spPr>
+          <a:xfrm flipV="1">
+            <a:off x="5533698" y="2065283"/>
+            <a:ext cx="31532" cy="4225158"/>
+          </a:xfrm>
+          <a:prstGeom prst="line">
+            <a:avLst/>
+          </a:prstGeom>
+          <a:ln w="28575"/>
+          <a:effectLst>
+            <a:outerShdw blurRad="50800" dist="38100" dir="2700000" algn="tl" rotWithShape="0">
+              <a:prstClr val="black">
+                <a:alpha val="40000"/>
+              </a:prstClr>
+            </a:outerShdw>
+          </a:effectLst>
+        </p:spPr>
+        <p:style>
+          <a:lnRef idx="1">
+            <a:schemeClr val="dk1"/>
+          </a:lnRef>
+          <a:fillRef idx="0">
+            <a:schemeClr val="dk1"/>
+          </a:fillRef>
+          <a:effectRef idx="0">
+            <a:schemeClr val="dk1"/>
+          </a:effectRef>
+          <a:fontRef idx="minor">
+            <a:schemeClr val="tx1"/>
+          </a:fontRef>
+        </p:style>
+      </p:cxnSp>
+      <p:sp>
+        <p:nvSpPr>
+          <p:cNvPr id="8" name="Right Arrow 7"/>
+          <p:cNvSpPr/>
+          <p:nvPr/>
+        </p:nvSpPr>
+        <p:spPr>
+          <a:xfrm>
+            <a:off x="5707117" y="2065283"/>
+            <a:ext cx="693683" cy="209792"/>
+          </a:xfrm>
+          <a:prstGeom prst="rightArrow">
+            <a:avLst/>
+          </a:prstGeom>
+        </p:spPr>
+        <p:style>
+          <a:lnRef idx="2">
+            <a:schemeClr val="accent1">
+              <a:shade val="50000"/>
+            </a:schemeClr>
+          </a:lnRef>
+          <a:fillRef idx="1">
+            <a:schemeClr val="accent1"/>
+          </a:fillRef>
+          <a:effectRef idx="0">
+            <a:schemeClr val="accent1"/>
+          </a:effectRef>
+          <a:fontRef idx="minor">
+            <a:schemeClr val="lt1"/>
+          </a:fontRef>
+        </p:style>
+        <p:txBody>
+          <a:bodyPr rtlCol="0" anchor="ctr"/>
+          <a:lstStyle/>
+          <a:p>
+            <a:pPr algn="ctr"/>
+            <a:endParaRPr lang="en-US"/>
+          </a:p>
+        </p:txBody>
+      </p:sp>
+      <p:sp>
+        <p:nvSpPr>
+          <p:cNvPr id="9" name="Right Arrow 8"/>
+          <p:cNvSpPr/>
+          <p:nvPr/>
+        </p:nvSpPr>
+        <p:spPr>
+          <a:xfrm rot="10800000">
+            <a:off x="4740131" y="2060023"/>
+            <a:ext cx="693683" cy="209792"/>
+          </a:xfrm>
+          <a:prstGeom prst="rightArrow">
+            <a:avLst/>
+          </a:prstGeom>
+        </p:spPr>
+        <p:style>
+          <a:lnRef idx="2">
+            <a:schemeClr val="accent1">
+              <a:shade val="50000"/>
+            </a:schemeClr>
+          </a:lnRef>
+          <a:fillRef idx="1">
+            <a:schemeClr val="accent1"/>
+          </a:fillRef>
+          <a:effectRef idx="0">
+            <a:schemeClr val="accent1"/>
+          </a:effectRef>
+          <a:fontRef idx="minor">
+            <a:schemeClr val="lt1"/>
+          </a:fontRef>
+        </p:style>
+        <p:txBody>
+          <a:bodyPr rtlCol="0" anchor="ctr"/>
+          <a:lstStyle/>
+          <a:p>
+            <a:pPr algn="ctr"/>
+            <a:endParaRPr lang="en-US"/>
+          </a:p>
+        </p:txBody>
+      </p:sp>
+      <p:sp>
+        <p:nvSpPr>
+          <p:cNvPr id="10" name="TextBox 9"/>
+          <p:cNvSpPr txBox="1"/>
+          <p:nvPr/>
+        </p:nvSpPr>
+        <p:spPr>
+          <a:xfrm>
+            <a:off x="6416555" y="1981193"/>
+            <a:ext cx="2096814" cy="369332"/>
+          </a:xfrm>
+          <a:prstGeom prst="rect">
+            <a:avLst/>
+          </a:prstGeom>
+          <a:noFill/>
+        </p:spPr>
+        <p:txBody>
+          <a:bodyPr wrap="square" rtlCol="0">
+            <a:spAutoFit/>
+          </a:bodyPr>
+          <a:lstStyle/>
+          <a:p>
+            <a:r>
+              <a:rPr lang="en-US" dirty="0" smtClean="0"/>
+              <a:t>“Large Difference”</a:t>
+            </a:r>
+            <a:endParaRPr lang="en-US" dirty="0"/>
+          </a:p>
+        </p:txBody>
+      </p:sp>
+      <p:sp>
+        <p:nvSpPr>
+          <p:cNvPr id="11" name="TextBox 10"/>
+          <p:cNvSpPr txBox="1"/>
+          <p:nvPr/>
+        </p:nvSpPr>
+        <p:spPr>
+          <a:xfrm>
+            <a:off x="3841533" y="1992431"/>
+            <a:ext cx="2096814" cy="646331"/>
+          </a:xfrm>
+          <a:prstGeom prst="rect">
+            <a:avLst/>
+          </a:prstGeom>
+          <a:noFill/>
+        </p:spPr>
+        <p:txBody>
+          <a:bodyPr wrap="square" rtlCol="0">
+            <a:spAutoFit/>
+          </a:bodyPr>
+          <a:lstStyle/>
+          <a:p>
+            <a:r>
+              <a:rPr lang="en-US" dirty="0" smtClean="0"/>
+              <a:t>“Small </a:t>
+            </a:r>
+          </a:p>
+          <a:p>
+            <a:r>
+              <a:rPr lang="en-US" dirty="0" smtClean="0"/>
+              <a:t>Difference”</a:t>
+            </a:r>
+            <a:endParaRPr lang="en-US" dirty="0"/>
+          </a:p>
+        </p:txBody>
+      </p:sp>
     </p:spTree>
     <p:extLst>
       <p:ext uri="{BB962C8B-B14F-4D97-AF65-F5344CB8AC3E}">
@@ -4381,7 +4724,7 @@
 </p:sld>
 </file>
 
-<file path=ppt/slides/slide8.xml><?xml version="1.0" encoding="utf-8"?>
+<file path=ppt/slides/slide9.xml><?xml version="1.0" encoding="utf-8"?>
 <p:sld xmlns:a="http://schemas.openxmlformats.org/drawingml/2006/main" xmlns:r="http://schemas.openxmlformats.org/officeDocument/2006/relationships" xmlns:p="http://schemas.openxmlformats.org/presentationml/2006/main">
   <p:cSld>
     <p:spTree>
@@ -4457,7 +4800,7 @@
         </p:nvSpPr>
         <p:spPr>
           <a:xfrm>
-            <a:off x="1146114" y="2228984"/>
+            <a:off x="431004" y="1975835"/>
             <a:ext cx="3955763" cy="646331"/>
           </a:xfrm>
           <a:prstGeom prst="rect">
@@ -4471,37 +4814,8 @@
           <a:lstStyle/>
           <a:p>
             <a:r>
-              <a:rPr lang="en-US" sz="3600" smtClean="0"/>
+              <a:rPr lang="en-US" sz="3600" dirty="0" smtClean="0"/>
               <a:t>Rigorous Instruction</a:t>
-            </a:r>
-            <a:endParaRPr lang="en-US" sz="3600" dirty="0"/>
-          </a:p>
-        </p:txBody>
-      </p:sp>
-      <p:sp>
-        <p:nvSpPr>
-          <p:cNvPr id="6" name="Rectangle 5"/>
-          <p:cNvSpPr/>
-          <p:nvPr/>
-        </p:nvSpPr>
-        <p:spPr>
-          <a:xfrm>
-            <a:off x="2572145" y="4437905"/>
-            <a:ext cx="4726935" cy="646331"/>
-          </a:xfrm>
-          <a:prstGeom prst="rect">
-            <a:avLst/>
-          </a:prstGeom>
-        </p:spPr>
-        <p:txBody>
-          <a:bodyPr wrap="none">
-            <a:spAutoFit/>
-          </a:bodyPr>
-          <a:lstStyle/>
-          <a:p>
-            <a:r>
-              <a:rPr lang="en-US" sz="3600" smtClean="0"/>
-              <a:t>Supportive Environment</a:t>
             </a:r>
             <a:endParaRPr lang="en-US" sz="3600" dirty="0"/>
           </a:p>
@@ -4515,7 +4829,7 @@
         </p:nvSpPr>
         <p:spPr>
           <a:xfrm>
-            <a:off x="5185590" y="3244334"/>
+            <a:off x="431004" y="2856809"/>
             <a:ext cx="2909130" cy="646331"/>
           </a:xfrm>
           <a:prstGeom prst="rect">
@@ -4529,13 +4843,427 @@
           <a:lstStyle/>
           <a:p>
             <a:r>
-              <a:rPr lang="en-US" sz="3600" smtClean="0"/>
+              <a:rPr lang="en-US" sz="3600" dirty="0" smtClean="0"/>
               <a:t>Student Safety</a:t>
             </a:r>
             <a:endParaRPr lang="en-US" sz="3600" dirty="0"/>
           </a:p>
         </p:txBody>
       </p:sp>
+      <p:graphicFrame>
+        <p:nvGraphicFramePr>
+          <p:cNvPr id="3" name="Table 2"/>
+          <p:cNvGraphicFramePr>
+            <a:graphicFrameLocks noGrp="1"/>
+          </p:cNvGraphicFramePr>
+          <p:nvPr>
+            <p:extLst>
+              <p:ext uri="{D42A27DB-BD31-4B8C-83A1-F6EECF244321}">
+                <p14:modId xmlns:p14="http://schemas.microsoft.com/office/powerpoint/2010/main" val="1753964739"/>
+              </p:ext>
+            </p:extLst>
+          </p:nvPr>
+        </p:nvGraphicFramePr>
+        <p:xfrm>
+          <a:off x="519806" y="3955236"/>
+          <a:ext cx="3495603" cy="1920240"/>
+        </p:xfrm>
+        <a:graphic>
+          <a:graphicData uri="http://schemas.openxmlformats.org/drawingml/2006/table">
+            <a:tbl>
+              <a:tblPr firstRow="1" bandRow="1">
+                <a:tableStyleId>{5A111915-BE36-4E01-A7E5-04B1672EAD32}</a:tableStyleId>
+              </a:tblPr>
+              <a:tblGrid>
+                <a:gridCol w="1165201"/>
+                <a:gridCol w="1165201"/>
+                <a:gridCol w="1165201"/>
+              </a:tblGrid>
+              <a:tr h="370840">
+                <a:tc>
+                  <a:txBody>
+                    <a:bodyPr/>
+                    <a:lstStyle/>
+                    <a:p>
+                      <a:pPr algn="ctr"/>
+                      <a:r>
+                        <a:rPr lang="en-US" sz="1800" dirty="0" smtClean="0">
+                          <a:solidFill>
+                            <a:schemeClr val="tx1"/>
+                          </a:solidFill>
+                        </a:rPr>
+                        <a:t>Confusion Matrix</a:t>
+                      </a:r>
+                      <a:endParaRPr lang="en-US" sz="1800" dirty="0">
+                        <a:solidFill>
+                          <a:schemeClr val="tx1"/>
+                        </a:solidFill>
+                      </a:endParaRPr>
+                    </a:p>
+                  </a:txBody>
+                  <a:tcPr>
+                    <a:noFill/>
+                  </a:tcPr>
+                </a:tc>
+                <a:tc>
+                  <a:txBody>
+                    <a:bodyPr/>
+                    <a:lstStyle/>
+                    <a:p>
+                      <a:pPr algn="ctr"/>
+                      <a:r>
+                        <a:rPr lang="en-US" sz="2000" dirty="0" smtClean="0">
+                          <a:solidFill>
+                            <a:schemeClr val="tx1"/>
+                          </a:solidFill>
+                        </a:rPr>
+                        <a:t>Correct</a:t>
+                      </a:r>
+                      <a:endParaRPr lang="en-US" sz="2000" dirty="0">
+                        <a:solidFill>
+                          <a:schemeClr val="tx1"/>
+                        </a:solidFill>
+                      </a:endParaRPr>
+                    </a:p>
+                  </a:txBody>
+                  <a:tcPr anchor="ctr">
+                    <a:noFill/>
+                  </a:tcPr>
+                </a:tc>
+                <a:tc>
+                  <a:txBody>
+                    <a:bodyPr/>
+                    <a:lstStyle/>
+                    <a:p>
+                      <a:pPr algn="ctr"/>
+                      <a:r>
+                        <a:rPr lang="en-US" sz="2000" dirty="0" smtClean="0">
+                          <a:solidFill>
+                            <a:schemeClr val="tx1"/>
+                          </a:solidFill>
+                        </a:rPr>
+                        <a:t>Incorrect</a:t>
+                      </a:r>
+                      <a:endParaRPr lang="en-US" sz="2000" dirty="0">
+                        <a:solidFill>
+                          <a:schemeClr val="tx1"/>
+                        </a:solidFill>
+                      </a:endParaRPr>
+                    </a:p>
+                  </a:txBody>
+                  <a:tcPr anchor="ctr">
+                    <a:noFill/>
+                  </a:tcPr>
+                </a:tc>
+              </a:tr>
+              <a:tr h="370840">
+                <a:tc>
+                  <a:txBody>
+                    <a:bodyPr/>
+                    <a:lstStyle/>
+                    <a:p>
+                      <a:pPr algn="ctr"/>
+                      <a:r>
+                        <a:rPr lang="en-US" sz="1800" dirty="0" smtClean="0"/>
+                        <a:t>Small  Difference</a:t>
+                      </a:r>
+                      <a:endParaRPr lang="en-US" sz="1800" dirty="0"/>
+                    </a:p>
+                  </a:txBody>
+                  <a:tcPr>
+                    <a:solidFill>
+                      <a:srgbClr val="92D050"/>
+                    </a:solidFill>
+                  </a:tcPr>
+                </a:tc>
+                <a:tc>
+                  <a:txBody>
+                    <a:bodyPr/>
+                    <a:lstStyle/>
+                    <a:p>
+                      <a:pPr algn="ctr"/>
+                      <a:r>
+                        <a:rPr lang="en-US" sz="2000" dirty="0" smtClean="0"/>
+                        <a:t>41</a:t>
+                      </a:r>
+                      <a:endParaRPr lang="en-US" sz="2000" b="1" dirty="0"/>
+                    </a:p>
+                  </a:txBody>
+                  <a:tcPr anchor="ctr">
+                    <a:solidFill>
+                      <a:srgbClr val="92D050"/>
+                    </a:solidFill>
+                  </a:tcPr>
+                </a:tc>
+                <a:tc>
+                  <a:txBody>
+                    <a:bodyPr/>
+                    <a:lstStyle/>
+                    <a:p>
+                      <a:pPr algn="ctr"/>
+                      <a:r>
+                        <a:rPr lang="en-US" sz="2000" dirty="0" smtClean="0"/>
+                        <a:t>40</a:t>
+                      </a:r>
+                      <a:endParaRPr lang="en-US" sz="2000" b="1" dirty="0"/>
+                    </a:p>
+                  </a:txBody>
+                  <a:tcPr anchor="ctr">
+                    <a:solidFill>
+                      <a:srgbClr val="92D050"/>
+                    </a:solidFill>
+                  </a:tcPr>
+                </a:tc>
+              </a:tr>
+              <a:tr h="370840">
+                <a:tc>
+                  <a:txBody>
+                    <a:bodyPr/>
+                    <a:lstStyle/>
+                    <a:p>
+                      <a:pPr algn="ctr"/>
+                      <a:r>
+                        <a:rPr lang="en-US" sz="1800" dirty="0" smtClean="0"/>
+                        <a:t>Large</a:t>
+                      </a:r>
+                      <a:r>
+                        <a:rPr lang="en-US" sz="1800" baseline="0" dirty="0" smtClean="0"/>
+                        <a:t>  Difference</a:t>
+                      </a:r>
+                      <a:endParaRPr lang="en-US" sz="1800" dirty="0"/>
+                    </a:p>
+                  </a:txBody>
+                  <a:tcPr>
+                    <a:solidFill>
+                      <a:schemeClr val="accent1">
+                        <a:lumMod val="60000"/>
+                        <a:lumOff val="40000"/>
+                      </a:schemeClr>
+                    </a:solidFill>
+                  </a:tcPr>
+                </a:tc>
+                <a:tc>
+                  <a:txBody>
+                    <a:bodyPr/>
+                    <a:lstStyle/>
+                    <a:p>
+                      <a:pPr algn="ctr"/>
+                      <a:r>
+                        <a:rPr lang="en-US" sz="2000" dirty="0" smtClean="0"/>
+                        <a:t>15</a:t>
+                      </a:r>
+                      <a:endParaRPr lang="en-US" sz="2000" b="1" dirty="0"/>
+                    </a:p>
+                  </a:txBody>
+                  <a:tcPr anchor="ctr">
+                    <a:solidFill>
+                      <a:schemeClr val="accent1">
+                        <a:lumMod val="60000"/>
+                        <a:lumOff val="40000"/>
+                      </a:schemeClr>
+                    </a:solidFill>
+                  </a:tcPr>
+                </a:tc>
+                <a:tc>
+                  <a:txBody>
+                    <a:bodyPr/>
+                    <a:lstStyle/>
+                    <a:p>
+                      <a:pPr algn="ctr"/>
+                      <a:r>
+                        <a:rPr lang="en-US" sz="2000" dirty="0" smtClean="0"/>
+                        <a:t>340</a:t>
+                      </a:r>
+                      <a:endParaRPr lang="en-US" sz="2000" b="1" dirty="0"/>
+                    </a:p>
+                  </a:txBody>
+                  <a:tcPr anchor="ctr">
+                    <a:solidFill>
+                      <a:schemeClr val="accent1">
+                        <a:lumMod val="60000"/>
+                        <a:lumOff val="40000"/>
+                      </a:schemeClr>
+                    </a:solidFill>
+                  </a:tcPr>
+                </a:tc>
+              </a:tr>
+            </a:tbl>
+          </a:graphicData>
+        </a:graphic>
+      </p:graphicFrame>
+      <p:grpSp>
+        <p:nvGrpSpPr>
+          <p:cNvPr id="4" name="Group 3"/>
+          <p:cNvGrpSpPr/>
+          <p:nvPr/>
+        </p:nvGrpSpPr>
+        <p:grpSpPr>
+          <a:xfrm>
+            <a:off x="4234366" y="1975835"/>
+            <a:ext cx="7794593" cy="4878642"/>
+            <a:chOff x="4234366" y="1975835"/>
+            <a:chExt cx="7794593" cy="4878642"/>
+          </a:xfrm>
+        </p:grpSpPr>
+        <p:pic>
+          <p:nvPicPr>
+            <p:cNvPr id="1027" name="Picture 3"/>
+            <p:cNvPicPr>
+              <a:picLocks noChangeAspect="1" noChangeArrowheads="1"/>
+            </p:cNvPicPr>
+            <p:nvPr/>
+          </p:nvPicPr>
+          <p:blipFill>
+            <a:blip r:embed="rId2">
+              <a:extLst>
+                <a:ext uri="{28A0092B-C50C-407E-A947-70E740481C1C}">
+                  <a14:useLocalDpi xmlns:a14="http://schemas.microsoft.com/office/drawing/2010/main" val="0"/>
+                </a:ext>
+              </a:extLst>
+            </a:blip>
+            <a:srcRect/>
+            <a:stretch>
+              <a:fillRect/>
+            </a:stretch>
+          </p:blipFill>
+          <p:spPr bwMode="auto">
+            <a:xfrm>
+              <a:off x="4234366" y="1975835"/>
+              <a:ext cx="7794593" cy="4695825"/>
+            </a:xfrm>
+            <a:prstGeom prst="rect">
+              <a:avLst/>
+            </a:prstGeom>
+            <a:noFill/>
+            <a:ln>
+              <a:noFill/>
+            </a:ln>
+            <a:extLst>
+              <a:ext uri="{909E8E84-426E-40DD-AFC4-6F175D3DCCD1}">
+                <a14:hiddenFill xmlns:a14="http://schemas.microsoft.com/office/drawing/2010/main">
+                  <a:solidFill>
+                    <a:schemeClr val="accent1"/>
+                  </a:solidFill>
+                </a14:hiddenFill>
+              </a:ext>
+              <a:ext uri="{91240B29-F687-4F45-9708-019B960494DF}">
+                <a14:hiddenLine xmlns:a14="http://schemas.microsoft.com/office/drawing/2010/main" w="9525">
+                  <a:solidFill>
+                    <a:schemeClr val="tx1"/>
+                  </a:solidFill>
+                  <a:miter lim="800000"/>
+                  <a:headEnd/>
+                  <a:tailEnd/>
+                </a14:hiddenLine>
+              </a:ext>
+            </a:extLst>
+          </p:spPr>
+        </p:pic>
+        <p:pic>
+          <p:nvPicPr>
+            <p:cNvPr id="9" name="Picture 3"/>
+            <p:cNvPicPr>
+              <a:picLocks noChangeAspect="1" noChangeArrowheads="1"/>
+            </p:cNvPicPr>
+            <p:nvPr/>
+          </p:nvPicPr>
+          <p:blipFill rotWithShape="1">
+            <a:blip r:embed="rId2">
+              <a:extLst>
+                <a:ext uri="{28A0092B-C50C-407E-A947-70E740481C1C}">
+                  <a14:useLocalDpi xmlns:a14="http://schemas.microsoft.com/office/drawing/2010/main" val="0"/>
+                </a:ext>
+              </a:extLst>
+            </a:blip>
+            <a:srcRect l="38784" t="93672" r="30608" b="-723"/>
+            <a:stretch/>
+          </p:blipFill>
+          <p:spPr bwMode="auto">
+            <a:xfrm>
+              <a:off x="6749578" y="6379997"/>
+              <a:ext cx="3419175" cy="474480"/>
+            </a:xfrm>
+            <a:prstGeom prst="rect">
+              <a:avLst/>
+            </a:prstGeom>
+            <a:noFill/>
+            <a:ln>
+              <a:noFill/>
+            </a:ln>
+            <a:extLst>
+              <a:ext uri="{909E8E84-426E-40DD-AFC4-6F175D3DCCD1}">
+                <a14:hiddenFill xmlns:a14="http://schemas.microsoft.com/office/drawing/2010/main">
+                  <a:solidFill>
+                    <a:schemeClr val="accent1"/>
+                  </a:solidFill>
+                </a14:hiddenFill>
+              </a:ext>
+              <a:ext uri="{91240B29-F687-4F45-9708-019B960494DF}">
+                <a14:hiddenLine xmlns:a14="http://schemas.microsoft.com/office/drawing/2010/main" w="9525">
+                  <a:solidFill>
+                    <a:schemeClr val="tx1"/>
+                  </a:solidFill>
+                  <a:miter lim="800000"/>
+                  <a:headEnd/>
+                  <a:tailEnd/>
+                </a14:hiddenLine>
+              </a:ext>
+            </a:extLst>
+          </p:spPr>
+        </p:pic>
+        <p:pic>
+          <p:nvPicPr>
+            <p:cNvPr id="10" name="Picture 3"/>
+            <p:cNvPicPr>
+              <a:picLocks noChangeAspect="1" noChangeArrowheads="1"/>
+            </p:cNvPicPr>
+            <p:nvPr/>
+          </p:nvPicPr>
+          <p:blipFill rotWithShape="1">
+            <a:blip r:embed="rId2">
+              <a:extLst>
+                <a:ext uri="{28A0092B-C50C-407E-A947-70E740481C1C}">
+                  <a14:useLocalDpi xmlns:a14="http://schemas.microsoft.com/office/drawing/2010/main" val="0"/>
+                </a:ext>
+              </a:extLst>
+            </a:blip>
+            <a:srcRect l="2739" t="19152" r="94522" b="27031"/>
+            <a:stretch/>
+          </p:blipFill>
+          <p:spPr bwMode="auto">
+            <a:xfrm>
+              <a:off x="4406148" y="2486706"/>
+              <a:ext cx="290696" cy="3441122"/>
+            </a:xfrm>
+            <a:prstGeom prst="rect">
+              <a:avLst/>
+            </a:prstGeom>
+            <a:noFill/>
+            <a:ln>
+              <a:noFill/>
+            </a:ln>
+            <a:extLst>
+              <a:ext uri="{909E8E84-426E-40DD-AFC4-6F175D3DCCD1}">
+                <a14:hiddenFill xmlns:a14="http://schemas.microsoft.com/office/drawing/2010/main">
+                  <a:solidFill>
+                    <a:schemeClr val="accent1"/>
+                  </a:solidFill>
+                </a14:hiddenFill>
+              </a:ext>
+              <a:ext uri="{91240B29-F687-4F45-9708-019B960494DF}">
+                <a14:hiddenLine xmlns:a14="http://schemas.microsoft.com/office/drawing/2010/main" w="9525">
+                  <a:solidFill>
+                    <a:schemeClr val="tx1"/>
+                  </a:solidFill>
+                  <a:miter lim="800000"/>
+                  <a:headEnd/>
+                  <a:tailEnd/>
+                </a14:hiddenLine>
+              </a:ext>
+            </a:extLst>
+          </p:spPr>
+        </p:pic>
+      </p:grpSp>
     </p:spTree>
     <p:extLst>
       <p:ext uri="{BB962C8B-B14F-4D97-AF65-F5344CB8AC3E}">
@@ -4804,7 +5532,7 @@
   <a:extraClrSchemeLst/>
   <a:extLst>
     <a:ext uri="{05A4C25C-085E-4340-85A3-A5531E510DB2}">
-      <thm15:themeFamily xmlns:thm15="http://schemas.microsoft.com/office/thememl/2012/main" name="Office Theme" id="{62F939B6-93AF-4DB8-9C6B-D6C7DFDC589F}" vid="{4A3C46E8-61CC-4603-A589-7422A47A8E4A}"/>
+      <thm15:themeFamily xmlns:thm15="http://schemas.microsoft.com/office/thememl/2012/main" xmlns="" name="Office Theme" id="{62F939B6-93AF-4DB8-9C6B-D6C7DFDC589F}" vid="{4A3C46E8-61CC-4603-A589-7422A47A8E4A}"/>
     </a:ext>
   </a:extLst>
 </a:theme>

</xml_diff>